<commit_message>
Update steps and images
</commit_message>
<xml_diff>
--- a/images/material.pptx
+++ b/images/material.pptx
@@ -7,8 +7,9 @@
   <p:sldIdLst>
     <p:sldId id="256" r:id="rId2"/>
     <p:sldId id="257" r:id="rId3"/>
-    <p:sldId id="258" r:id="rId4"/>
-    <p:sldId id="259" r:id="rId5"/>
+    <p:sldId id="260" r:id="rId4"/>
+    <p:sldId id="258" r:id="rId5"/>
+    <p:sldId id="259" r:id="rId6"/>
   </p:sldIdLst>
   <p:sldSz cx="12192000" cy="6858000"/>
   <p:notesSz cx="6858000" cy="9144000"/>
@@ -107,6 +108,11 @@
       </a:defRPr>
     </a:lvl9pPr>
   </p:defaultTextStyle>
+  <p:extLst>
+    <p:ext uri="{EFAFB233-063F-42B5-8137-9DF3F51BA10A}">
+      <p15:sldGuideLst xmlns:p15="http://schemas.microsoft.com/office/powerpoint/2012/main"/>
+    </p:ext>
+  </p:extLst>
 </p:presentation>
 </file>
 
@@ -257,7 +263,7 @@
           <a:p>
             <a:fld id="{9CAE5F41-0CBC-4600-B58D-DE072426C508}" type="datetimeFigureOut">
               <a:rPr kumimoji="1" lang="ja-JP" altLang="en-US" smtClean="0"/>
-              <a:t>2023/3/30</a:t>
+              <a:t>2023/6/11</a:t>
             </a:fld>
             <a:endParaRPr kumimoji="1" lang="ja-JP" altLang="en-US"/>
           </a:p>
@@ -487,7 +493,7 @@
           <a:p>
             <a:fld id="{9CAE5F41-0CBC-4600-B58D-DE072426C508}" type="datetimeFigureOut">
               <a:rPr kumimoji="1" lang="ja-JP" altLang="en-US" smtClean="0"/>
-              <a:t>2023/3/30</a:t>
+              <a:t>2023/6/11</a:t>
             </a:fld>
             <a:endParaRPr kumimoji="1" lang="ja-JP" altLang="en-US"/>
           </a:p>
@@ -727,7 +733,7 @@
           <a:p>
             <a:fld id="{9CAE5F41-0CBC-4600-B58D-DE072426C508}" type="datetimeFigureOut">
               <a:rPr kumimoji="1" lang="ja-JP" altLang="en-US" smtClean="0"/>
-              <a:t>2023/3/30</a:t>
+              <a:t>2023/6/11</a:t>
             </a:fld>
             <a:endParaRPr kumimoji="1" lang="ja-JP" altLang="en-US"/>
           </a:p>
@@ -957,7 +963,7 @@
           <a:p>
             <a:fld id="{9CAE5F41-0CBC-4600-B58D-DE072426C508}" type="datetimeFigureOut">
               <a:rPr kumimoji="1" lang="ja-JP" altLang="en-US" smtClean="0"/>
-              <a:t>2023/3/30</a:t>
+              <a:t>2023/6/11</a:t>
             </a:fld>
             <a:endParaRPr kumimoji="1" lang="ja-JP" altLang="en-US"/>
           </a:p>
@@ -1232,7 +1238,7 @@
           <a:p>
             <a:fld id="{9CAE5F41-0CBC-4600-B58D-DE072426C508}" type="datetimeFigureOut">
               <a:rPr kumimoji="1" lang="ja-JP" altLang="en-US" smtClean="0"/>
-              <a:t>2023/3/30</a:t>
+              <a:t>2023/6/11</a:t>
             </a:fld>
             <a:endParaRPr kumimoji="1" lang="ja-JP" altLang="en-US"/>
           </a:p>
@@ -1561,7 +1567,7 @@
           <a:p>
             <a:fld id="{9CAE5F41-0CBC-4600-B58D-DE072426C508}" type="datetimeFigureOut">
               <a:rPr kumimoji="1" lang="ja-JP" altLang="en-US" smtClean="0"/>
-              <a:t>2023/3/30</a:t>
+              <a:t>2023/6/11</a:t>
             </a:fld>
             <a:endParaRPr kumimoji="1" lang="ja-JP" altLang="en-US"/>
           </a:p>
@@ -2037,7 +2043,7 @@
           <a:p>
             <a:fld id="{9CAE5F41-0CBC-4600-B58D-DE072426C508}" type="datetimeFigureOut">
               <a:rPr kumimoji="1" lang="ja-JP" altLang="en-US" smtClean="0"/>
-              <a:t>2023/3/30</a:t>
+              <a:t>2023/6/11</a:t>
             </a:fld>
             <a:endParaRPr kumimoji="1" lang="ja-JP" altLang="en-US"/>
           </a:p>
@@ -2178,7 +2184,7 @@
           <a:p>
             <a:fld id="{9CAE5F41-0CBC-4600-B58D-DE072426C508}" type="datetimeFigureOut">
               <a:rPr kumimoji="1" lang="ja-JP" altLang="en-US" smtClean="0"/>
-              <a:t>2023/3/30</a:t>
+              <a:t>2023/6/11</a:t>
             </a:fld>
             <a:endParaRPr kumimoji="1" lang="ja-JP" altLang="en-US"/>
           </a:p>
@@ -2291,7 +2297,7 @@
           <a:p>
             <a:fld id="{9CAE5F41-0CBC-4600-B58D-DE072426C508}" type="datetimeFigureOut">
               <a:rPr kumimoji="1" lang="ja-JP" altLang="en-US" smtClean="0"/>
-              <a:t>2023/3/30</a:t>
+              <a:t>2023/6/11</a:t>
             </a:fld>
             <a:endParaRPr kumimoji="1" lang="ja-JP" altLang="en-US"/>
           </a:p>
@@ -2634,7 +2640,7 @@
           <a:p>
             <a:fld id="{9CAE5F41-0CBC-4600-B58D-DE072426C508}" type="datetimeFigureOut">
               <a:rPr kumimoji="1" lang="ja-JP" altLang="en-US" smtClean="0"/>
-              <a:t>2023/3/30</a:t>
+              <a:t>2023/6/11</a:t>
             </a:fld>
             <a:endParaRPr kumimoji="1" lang="ja-JP" altLang="en-US"/>
           </a:p>
@@ -2922,7 +2928,7 @@
           <a:p>
             <a:fld id="{9CAE5F41-0CBC-4600-B58D-DE072426C508}" type="datetimeFigureOut">
               <a:rPr kumimoji="1" lang="ja-JP" altLang="en-US" smtClean="0"/>
-              <a:t>2023/3/30</a:t>
+              <a:t>2023/6/11</a:t>
             </a:fld>
             <a:endParaRPr kumimoji="1" lang="ja-JP" altLang="en-US"/>
           </a:p>
@@ -3195,7 +3201,7 @@
           <a:p>
             <a:fld id="{9CAE5F41-0CBC-4600-B58D-DE072426C508}" type="datetimeFigureOut">
               <a:rPr kumimoji="1" lang="ja-JP" altLang="en-US" smtClean="0"/>
-              <a:t>2023/3/30</a:t>
+              <a:t>2023/6/11</a:t>
             </a:fld>
             <a:endParaRPr kumimoji="1" lang="ja-JP" altLang="en-US"/>
           </a:p>
@@ -6484,10 +6490,10 @@
       </p:grpSpPr>
       <p:pic>
         <p:nvPicPr>
-          <p:cNvPr id="9" name="図 8">
-            <a:extLst>
-              <a:ext uri="{FF2B5EF4-FFF2-40B4-BE49-F238E27FC236}">
-                <a16:creationId xmlns:a16="http://schemas.microsoft.com/office/drawing/2014/main" id="{DD524D28-5D1D-D1A1-371E-A9C4A263F6B0}"/>
+          <p:cNvPr id="3" name="図 2">
+            <a:extLst>
+              <a:ext uri="{FF2B5EF4-FFF2-40B4-BE49-F238E27FC236}">
+                <a16:creationId xmlns:a16="http://schemas.microsoft.com/office/drawing/2014/main" id="{8D051F81-536A-AA58-821E-4282CD9D68E3}"/>
               </a:ext>
             </a:extLst>
           </p:cNvPr>
@@ -6504,8 +6510,8 @@
         </p:blipFill>
         <p:spPr>
           <a:xfrm>
-            <a:off x="566485" y="3294921"/>
-            <a:ext cx="4248724" cy="1228147"/>
+            <a:off x="788210" y="1290181"/>
+            <a:ext cx="2470662" cy="1795720"/>
           </a:xfrm>
           <a:prstGeom prst="rect">
             <a:avLst/>
@@ -6514,10 +6520,10 @@
       </p:pic>
       <p:pic>
         <p:nvPicPr>
-          <p:cNvPr id="3" name="図 2">
-            <a:extLst>
-              <a:ext uri="{FF2B5EF4-FFF2-40B4-BE49-F238E27FC236}">
-                <a16:creationId xmlns:a16="http://schemas.microsoft.com/office/drawing/2014/main" id="{F5A05415-A47E-846A-3D1C-9D48EEF52FE0}"/>
+          <p:cNvPr id="5" name="図 4">
+            <a:extLst>
+              <a:ext uri="{FF2B5EF4-FFF2-40B4-BE49-F238E27FC236}">
+                <a16:creationId xmlns:a16="http://schemas.microsoft.com/office/drawing/2014/main" id="{39F963A6-180C-DA3C-1D13-EB0C3245780A}"/>
               </a:ext>
             </a:extLst>
           </p:cNvPr>
@@ -6534,8 +6540,8 @@
         </p:blipFill>
         <p:spPr>
           <a:xfrm>
-            <a:off x="512055" y="363133"/>
-            <a:ext cx="4248724" cy="2503819"/>
+            <a:off x="788210" y="3154150"/>
+            <a:ext cx="3533337" cy="2457028"/>
           </a:xfrm>
           <a:prstGeom prst="rect">
             <a:avLst/>
@@ -6544,10 +6550,10 @@
       </p:pic>
       <p:sp>
         <p:nvSpPr>
-          <p:cNvPr id="4" name="楕円 3">
-            <a:extLst>
-              <a:ext uri="{FF2B5EF4-FFF2-40B4-BE49-F238E27FC236}">
-                <a16:creationId xmlns:a16="http://schemas.microsoft.com/office/drawing/2014/main" id="{4AEB14E4-E4B1-D078-92D4-D6F67CB13E4A}"/>
+          <p:cNvPr id="6" name="正方形/長方形 5">
+            <a:extLst>
+              <a:ext uri="{FF2B5EF4-FFF2-40B4-BE49-F238E27FC236}">
+                <a16:creationId xmlns:a16="http://schemas.microsoft.com/office/drawing/2014/main" id="{773FE7C0-CA32-59C6-20F7-7958FFE7743D}"/>
               </a:ext>
             </a:extLst>
           </p:cNvPr>
@@ -6556,20 +6562,18 @@
         </p:nvSpPr>
         <p:spPr>
           <a:xfrm>
-            <a:off x="4431328" y="1794773"/>
-            <a:ext cx="224176" cy="224175"/>
-          </a:xfrm>
-          <a:prstGeom prst="ellipse">
+            <a:off x="788210" y="3707704"/>
+            <a:ext cx="366696" cy="136586"/>
+          </a:xfrm>
+          <a:prstGeom prst="rect">
             <a:avLst/>
           </a:prstGeom>
-          <a:noFill/>
-          <a:effectLst>
-            <a:outerShdw blurRad="50800" dist="38100" dir="2700000" algn="tl" rotWithShape="0">
-              <a:prstClr val="black">
-                <a:alpha val="40000"/>
-              </a:prstClr>
-            </a:outerShdw>
-          </a:effectLst>
+          <a:solidFill>
+            <a:schemeClr val="bg1"/>
+          </a:solidFill>
+          <a:ln>
+            <a:noFill/>
+          </a:ln>
         </p:spPr>
         <p:style>
           <a:lnRef idx="2">
@@ -6592,456 +6596,14 @@
           <a:lstStyle/>
           <a:p>
             <a:pPr algn="ctr"/>
-            <a:endParaRPr kumimoji="1" lang="ja-JP" altLang="en-US" dirty="0"/>
-          </a:p>
-        </p:txBody>
-      </p:sp>
-      <p:sp>
-        <p:nvSpPr>
-          <p:cNvPr id="7" name="楕円 6">
-            <a:extLst>
-              <a:ext uri="{FF2B5EF4-FFF2-40B4-BE49-F238E27FC236}">
-                <a16:creationId xmlns:a16="http://schemas.microsoft.com/office/drawing/2014/main" id="{BE9CE535-1542-54A5-31E4-D07E5B2C557F}"/>
-              </a:ext>
-            </a:extLst>
-          </p:cNvPr>
-          <p:cNvSpPr/>
-          <p:nvPr/>
-        </p:nvSpPr>
-        <p:spPr>
-          <a:xfrm>
-            <a:off x="1246414" y="3509273"/>
-            <a:ext cx="1583871" cy="458570"/>
-          </a:xfrm>
-          <a:prstGeom prst="ellipse">
-            <a:avLst/>
-          </a:prstGeom>
-          <a:noFill/>
-          <a:effectLst>
-            <a:outerShdw blurRad="50800" dist="38100" dir="2700000" algn="tl" rotWithShape="0">
-              <a:prstClr val="black">
-                <a:alpha val="40000"/>
-              </a:prstClr>
-            </a:outerShdw>
-          </a:effectLst>
-        </p:spPr>
-        <p:style>
-          <a:lnRef idx="2">
-            <a:schemeClr val="accent1">
-              <a:shade val="50000"/>
-            </a:schemeClr>
-          </a:lnRef>
-          <a:fillRef idx="1">
-            <a:schemeClr val="accent1"/>
-          </a:fillRef>
-          <a:effectRef idx="0">
-            <a:schemeClr val="accent1"/>
-          </a:effectRef>
-          <a:fontRef idx="minor">
-            <a:schemeClr val="lt1"/>
-          </a:fontRef>
-        </p:style>
-        <p:txBody>
-          <a:bodyPr rtlCol="0" anchor="ctr"/>
-          <a:lstStyle/>
-          <a:p>
-            <a:pPr algn="ctr"/>
-            <a:endParaRPr kumimoji="1" lang="ja-JP" altLang="en-US" dirty="0"/>
-          </a:p>
-        </p:txBody>
-      </p:sp>
-      <p:pic>
-        <p:nvPicPr>
-          <p:cNvPr id="11" name="図 10">
-            <a:extLst>
-              <a:ext uri="{FF2B5EF4-FFF2-40B4-BE49-F238E27FC236}">
-                <a16:creationId xmlns:a16="http://schemas.microsoft.com/office/drawing/2014/main" id="{6CCA453D-9E28-82D2-E603-7C92B0F6F956}"/>
-              </a:ext>
-            </a:extLst>
-          </p:cNvPr>
-          <p:cNvPicPr>
-            <a:picLocks noChangeAspect="1"/>
-          </p:cNvPicPr>
-          <p:nvPr/>
-        </p:nvPicPr>
-        <p:blipFill>
-          <a:blip r:embed="rId4"/>
-          <a:stretch>
-            <a:fillRect/>
-          </a:stretch>
-        </p:blipFill>
-        <p:spPr>
-          <a:xfrm>
-            <a:off x="5440708" y="363133"/>
-            <a:ext cx="3648863" cy="2561003"/>
-          </a:xfrm>
-          <a:prstGeom prst="rect">
-            <a:avLst/>
-          </a:prstGeom>
-        </p:spPr>
-      </p:pic>
-      <p:sp>
-        <p:nvSpPr>
-          <p:cNvPr id="12" name="楕円 11">
-            <a:extLst>
-              <a:ext uri="{FF2B5EF4-FFF2-40B4-BE49-F238E27FC236}">
-                <a16:creationId xmlns:a16="http://schemas.microsoft.com/office/drawing/2014/main" id="{FBFB953E-938D-EA4E-182A-9F05F61F9F66}"/>
-              </a:ext>
-            </a:extLst>
-          </p:cNvPr>
-          <p:cNvSpPr/>
-          <p:nvPr/>
-        </p:nvSpPr>
-        <p:spPr>
-          <a:xfrm>
-            <a:off x="5440708" y="1179380"/>
-            <a:ext cx="845792" cy="513350"/>
-          </a:xfrm>
-          <a:prstGeom prst="ellipse">
-            <a:avLst/>
-          </a:prstGeom>
-          <a:noFill/>
-          <a:effectLst>
-            <a:outerShdw blurRad="50800" dist="38100" dir="2700000" algn="tl" rotWithShape="0">
-              <a:prstClr val="black">
-                <a:alpha val="40000"/>
-              </a:prstClr>
-            </a:outerShdw>
-          </a:effectLst>
-        </p:spPr>
-        <p:style>
-          <a:lnRef idx="2">
-            <a:schemeClr val="accent1">
-              <a:shade val="50000"/>
-            </a:schemeClr>
-          </a:lnRef>
-          <a:fillRef idx="1">
-            <a:schemeClr val="accent1"/>
-          </a:fillRef>
-          <a:effectRef idx="0">
-            <a:schemeClr val="accent1"/>
-          </a:effectRef>
-          <a:fontRef idx="minor">
-            <a:schemeClr val="lt1"/>
-          </a:fontRef>
-        </p:style>
-        <p:txBody>
-          <a:bodyPr rtlCol="0" anchor="ctr"/>
-          <a:lstStyle/>
-          <a:p>
-            <a:pPr algn="ctr"/>
-            <a:endParaRPr kumimoji="1" lang="ja-JP" altLang="en-US" dirty="0"/>
-          </a:p>
-        </p:txBody>
-      </p:sp>
-      <p:sp>
-        <p:nvSpPr>
-          <p:cNvPr id="13" name="楕円 12">
-            <a:extLst>
-              <a:ext uri="{FF2B5EF4-FFF2-40B4-BE49-F238E27FC236}">
-                <a16:creationId xmlns:a16="http://schemas.microsoft.com/office/drawing/2014/main" id="{4092C93F-AF4D-83D8-D25E-CB534AA11A9D}"/>
-              </a:ext>
-            </a:extLst>
-          </p:cNvPr>
-          <p:cNvSpPr/>
-          <p:nvPr/>
-        </p:nvSpPr>
-        <p:spPr>
-          <a:xfrm>
-            <a:off x="8755408" y="1566429"/>
-            <a:ext cx="334163" cy="252602"/>
-          </a:xfrm>
-          <a:prstGeom prst="ellipse">
-            <a:avLst/>
-          </a:prstGeom>
-          <a:noFill/>
-          <a:effectLst>
-            <a:outerShdw blurRad="50800" dist="38100" dir="2700000" algn="tl" rotWithShape="0">
-              <a:prstClr val="black">
-                <a:alpha val="40000"/>
-              </a:prstClr>
-            </a:outerShdw>
-          </a:effectLst>
-        </p:spPr>
-        <p:style>
-          <a:lnRef idx="2">
-            <a:schemeClr val="accent1">
-              <a:shade val="50000"/>
-            </a:schemeClr>
-          </a:lnRef>
-          <a:fillRef idx="1">
-            <a:schemeClr val="accent1"/>
-          </a:fillRef>
-          <a:effectRef idx="0">
-            <a:schemeClr val="accent1"/>
-          </a:effectRef>
-          <a:fontRef idx="minor">
-            <a:schemeClr val="lt1"/>
-          </a:fontRef>
-        </p:style>
-        <p:txBody>
-          <a:bodyPr rtlCol="0" anchor="ctr"/>
-          <a:lstStyle/>
-          <a:p>
-            <a:pPr algn="ctr"/>
-            <a:endParaRPr kumimoji="1" lang="ja-JP" altLang="en-US" dirty="0"/>
-          </a:p>
-        </p:txBody>
-      </p:sp>
-      <p:sp>
-        <p:nvSpPr>
-          <p:cNvPr id="15" name="吹き出し: 四角形 14">
-            <a:extLst>
-              <a:ext uri="{FF2B5EF4-FFF2-40B4-BE49-F238E27FC236}">
-                <a16:creationId xmlns:a16="http://schemas.microsoft.com/office/drawing/2014/main" id="{B3B3C540-D999-BA26-52BF-378455A0ABE9}"/>
-              </a:ext>
-            </a:extLst>
-          </p:cNvPr>
-          <p:cNvSpPr/>
-          <p:nvPr/>
-        </p:nvSpPr>
-        <p:spPr>
-          <a:xfrm>
-            <a:off x="9023354" y="1906860"/>
-            <a:ext cx="1040490" cy="240726"/>
-          </a:xfrm>
-          <a:prstGeom prst="wedgeRectCallout">
-            <a:avLst>
-              <a:gd name="adj1" fmla="val -52518"/>
-              <a:gd name="adj2" fmla="val -95710"/>
-            </a:avLst>
-          </a:prstGeom>
-          <a:effectLst>
-            <a:outerShdw blurRad="50800" dist="38100" dir="2700000" algn="tl" rotWithShape="0">
-              <a:prstClr val="black">
-                <a:alpha val="40000"/>
-              </a:prstClr>
-            </a:outerShdw>
-          </a:effectLst>
-        </p:spPr>
-        <p:style>
-          <a:lnRef idx="2">
-            <a:schemeClr val="dk1"/>
-          </a:lnRef>
-          <a:fillRef idx="1">
-            <a:schemeClr val="lt1"/>
-          </a:fillRef>
-          <a:effectRef idx="0">
-            <a:schemeClr val="dk1"/>
-          </a:effectRef>
-          <a:fontRef idx="minor">
-            <a:schemeClr val="dk1"/>
-          </a:fontRef>
-        </p:style>
-        <p:txBody>
-          <a:bodyPr rtlCol="0" anchor="ctr"/>
-          <a:lstStyle/>
-          <a:p>
-            <a:pPr algn="ctr"/>
-            <a:r>
-              <a:rPr lang="en-US" altLang="ja-JP" sz="1050" dirty="0"/>
-              <a:t>Add Image</a:t>
-            </a:r>
-            <a:endParaRPr kumimoji="1" lang="ja-JP" altLang="en-US" sz="1050" dirty="0"/>
-          </a:p>
-        </p:txBody>
-      </p:sp>
-      <p:sp>
-        <p:nvSpPr>
-          <p:cNvPr id="16" name="楕円 15">
-            <a:extLst>
-              <a:ext uri="{FF2B5EF4-FFF2-40B4-BE49-F238E27FC236}">
-                <a16:creationId xmlns:a16="http://schemas.microsoft.com/office/drawing/2014/main" id="{CBC0D50F-00E5-6014-7A22-561449848D8D}"/>
-              </a:ext>
-            </a:extLst>
-          </p:cNvPr>
-          <p:cNvSpPr/>
-          <p:nvPr/>
-        </p:nvSpPr>
-        <p:spPr>
-          <a:xfrm>
-            <a:off x="8646550" y="2671534"/>
-            <a:ext cx="334163" cy="252602"/>
-          </a:xfrm>
-          <a:prstGeom prst="ellipse">
-            <a:avLst/>
-          </a:prstGeom>
-          <a:noFill/>
-          <a:effectLst>
-            <a:outerShdw blurRad="50800" dist="38100" dir="2700000" algn="tl" rotWithShape="0">
-              <a:prstClr val="black">
-                <a:alpha val="40000"/>
-              </a:prstClr>
-            </a:outerShdw>
-          </a:effectLst>
-        </p:spPr>
-        <p:style>
-          <a:lnRef idx="2">
-            <a:schemeClr val="accent1">
-              <a:shade val="50000"/>
-            </a:schemeClr>
-          </a:lnRef>
-          <a:fillRef idx="1">
-            <a:schemeClr val="accent1"/>
-          </a:fillRef>
-          <a:effectRef idx="0">
-            <a:schemeClr val="accent1"/>
-          </a:effectRef>
-          <a:fontRef idx="minor">
-            <a:schemeClr val="lt1"/>
-          </a:fontRef>
-        </p:style>
-        <p:txBody>
-          <a:bodyPr rtlCol="0" anchor="ctr"/>
-          <a:lstStyle/>
-          <a:p>
-            <a:pPr algn="ctr"/>
-            <a:endParaRPr kumimoji="1" lang="ja-JP" altLang="en-US" dirty="0"/>
-          </a:p>
-        </p:txBody>
-      </p:sp>
-      <p:pic>
-        <p:nvPicPr>
-          <p:cNvPr id="18" name="図 17">
-            <a:extLst>
-              <a:ext uri="{FF2B5EF4-FFF2-40B4-BE49-F238E27FC236}">
-                <a16:creationId xmlns:a16="http://schemas.microsoft.com/office/drawing/2014/main" id="{D8584B8B-611A-C7BD-6508-F55CD397F6B4}"/>
-              </a:ext>
-            </a:extLst>
-          </p:cNvPr>
-          <p:cNvPicPr>
-            <a:picLocks noChangeAspect="1"/>
-          </p:cNvPicPr>
-          <p:nvPr/>
-        </p:nvPicPr>
-        <p:blipFill>
-          <a:blip r:embed="rId5"/>
-          <a:stretch>
-            <a:fillRect/>
-          </a:stretch>
-        </p:blipFill>
-        <p:spPr>
-          <a:xfrm>
-            <a:off x="5440708" y="3330244"/>
-            <a:ext cx="3973182" cy="2867650"/>
-          </a:xfrm>
-          <a:prstGeom prst="rect">
-            <a:avLst/>
-          </a:prstGeom>
-        </p:spPr>
-      </p:pic>
-      <p:sp>
-        <p:nvSpPr>
-          <p:cNvPr id="19" name="楕円 18">
-            <a:extLst>
-              <a:ext uri="{FF2B5EF4-FFF2-40B4-BE49-F238E27FC236}">
-                <a16:creationId xmlns:a16="http://schemas.microsoft.com/office/drawing/2014/main" id="{0477A189-6BB5-4B27-17D6-DB9995470FC2}"/>
-              </a:ext>
-            </a:extLst>
-          </p:cNvPr>
-          <p:cNvSpPr/>
-          <p:nvPr/>
-        </p:nvSpPr>
-        <p:spPr>
-          <a:xfrm>
-            <a:off x="9023354" y="5291571"/>
-            <a:ext cx="334163" cy="252602"/>
-          </a:xfrm>
-          <a:prstGeom prst="ellipse">
-            <a:avLst/>
-          </a:prstGeom>
-          <a:noFill/>
-          <a:effectLst>
-            <a:outerShdw blurRad="50800" dist="38100" dir="2700000" algn="tl" rotWithShape="0">
-              <a:prstClr val="black">
-                <a:alpha val="40000"/>
-              </a:prstClr>
-            </a:outerShdw>
-          </a:effectLst>
-        </p:spPr>
-        <p:style>
-          <a:lnRef idx="2">
-            <a:schemeClr val="accent1">
-              <a:shade val="50000"/>
-            </a:schemeClr>
-          </a:lnRef>
-          <a:fillRef idx="1">
-            <a:schemeClr val="accent1"/>
-          </a:fillRef>
-          <a:effectRef idx="0">
-            <a:schemeClr val="accent1"/>
-          </a:effectRef>
-          <a:fontRef idx="minor">
-            <a:schemeClr val="lt1"/>
-          </a:fontRef>
-        </p:style>
-        <p:txBody>
-          <a:bodyPr rtlCol="0" anchor="ctr"/>
-          <a:lstStyle/>
-          <a:p>
-            <a:pPr algn="ctr"/>
-            <a:endParaRPr kumimoji="1" lang="ja-JP" altLang="en-US" dirty="0"/>
-          </a:p>
-        </p:txBody>
-      </p:sp>
-      <p:sp>
-        <p:nvSpPr>
-          <p:cNvPr id="20" name="楕円 19">
-            <a:extLst>
-              <a:ext uri="{FF2B5EF4-FFF2-40B4-BE49-F238E27FC236}">
-                <a16:creationId xmlns:a16="http://schemas.microsoft.com/office/drawing/2014/main" id="{528BDC93-49C7-E8C8-64BD-D72F4CC75E96}"/>
-              </a:ext>
-            </a:extLst>
-          </p:cNvPr>
-          <p:cNvSpPr/>
-          <p:nvPr/>
-        </p:nvSpPr>
-        <p:spPr>
-          <a:xfrm>
-            <a:off x="5519801" y="5291571"/>
-            <a:ext cx="766699" cy="252602"/>
-          </a:xfrm>
-          <a:prstGeom prst="ellipse">
-            <a:avLst/>
-          </a:prstGeom>
-          <a:noFill/>
-          <a:effectLst>
-            <a:outerShdw blurRad="50800" dist="38100" dir="2700000" algn="tl" rotWithShape="0">
-              <a:prstClr val="black">
-                <a:alpha val="40000"/>
-              </a:prstClr>
-            </a:outerShdw>
-          </a:effectLst>
-        </p:spPr>
-        <p:style>
-          <a:lnRef idx="2">
-            <a:schemeClr val="accent1">
-              <a:shade val="50000"/>
-            </a:schemeClr>
-          </a:lnRef>
-          <a:fillRef idx="1">
-            <a:schemeClr val="accent1"/>
-          </a:fillRef>
-          <a:effectRef idx="0">
-            <a:schemeClr val="accent1"/>
-          </a:effectRef>
-          <a:fontRef idx="minor">
-            <a:schemeClr val="lt1"/>
-          </a:fontRef>
-        </p:style>
-        <p:txBody>
-          <a:bodyPr rtlCol="0" anchor="ctr"/>
-          <a:lstStyle/>
-          <a:p>
-            <a:pPr algn="ctr"/>
-            <a:endParaRPr kumimoji="1" lang="ja-JP" altLang="en-US" dirty="0"/>
+            <a:endParaRPr kumimoji="1" lang="ja-JP" altLang="en-US"/>
           </a:p>
         </p:txBody>
       </p:sp>
     </p:spTree>
     <p:extLst>
       <p:ext uri="{BB962C8B-B14F-4D97-AF65-F5344CB8AC3E}">
-        <p14:creationId xmlns:p14="http://schemas.microsoft.com/office/powerpoint/2010/main" val="2738632757"/>
+        <p14:creationId xmlns:p14="http://schemas.microsoft.com/office/powerpoint/2010/main" val="2448846331"/>
       </p:ext>
     </p:extLst>
   </p:cSld>
@@ -7070,10 +6632,10 @@
       </p:grpSpPr>
       <p:pic>
         <p:nvPicPr>
-          <p:cNvPr id="3" name="図 2">
-            <a:extLst>
-              <a:ext uri="{FF2B5EF4-FFF2-40B4-BE49-F238E27FC236}">
-                <a16:creationId xmlns:a16="http://schemas.microsoft.com/office/drawing/2014/main" id="{C47B06C0-4721-650C-7E34-6A2DBC221BAA}"/>
+          <p:cNvPr id="9" name="図 8">
+            <a:extLst>
+              <a:ext uri="{FF2B5EF4-FFF2-40B4-BE49-F238E27FC236}">
+                <a16:creationId xmlns:a16="http://schemas.microsoft.com/office/drawing/2014/main" id="{DD524D28-5D1D-D1A1-371E-A9C4A263F6B0}"/>
               </a:ext>
             </a:extLst>
           </p:cNvPr>
@@ -7090,14 +6652,763 @@
         </p:blipFill>
         <p:spPr>
           <a:xfrm>
-            <a:off x="722826" y="622612"/>
-            <a:ext cx="4934639" cy="1486107"/>
+            <a:off x="566485" y="3294921"/>
+            <a:ext cx="4248724" cy="1228147"/>
           </a:xfrm>
           <a:prstGeom prst="rect">
             <a:avLst/>
           </a:prstGeom>
         </p:spPr>
       </p:pic>
+      <p:pic>
+        <p:nvPicPr>
+          <p:cNvPr id="3" name="図 2">
+            <a:extLst>
+              <a:ext uri="{FF2B5EF4-FFF2-40B4-BE49-F238E27FC236}">
+                <a16:creationId xmlns:a16="http://schemas.microsoft.com/office/drawing/2014/main" id="{F5A05415-A47E-846A-3D1C-9D48EEF52FE0}"/>
+              </a:ext>
+            </a:extLst>
+          </p:cNvPr>
+          <p:cNvPicPr>
+            <a:picLocks noChangeAspect="1"/>
+          </p:cNvPicPr>
+          <p:nvPr/>
+        </p:nvPicPr>
+        <p:blipFill>
+          <a:blip r:embed="rId3"/>
+          <a:stretch>
+            <a:fillRect/>
+          </a:stretch>
+        </p:blipFill>
+        <p:spPr>
+          <a:xfrm>
+            <a:off x="512055" y="363133"/>
+            <a:ext cx="4248724" cy="2503819"/>
+          </a:xfrm>
+          <a:prstGeom prst="rect">
+            <a:avLst/>
+          </a:prstGeom>
+        </p:spPr>
+      </p:pic>
+      <p:sp>
+        <p:nvSpPr>
+          <p:cNvPr id="4" name="楕円 3">
+            <a:extLst>
+              <a:ext uri="{FF2B5EF4-FFF2-40B4-BE49-F238E27FC236}">
+                <a16:creationId xmlns:a16="http://schemas.microsoft.com/office/drawing/2014/main" id="{4AEB14E4-E4B1-D078-92D4-D6F67CB13E4A}"/>
+              </a:ext>
+            </a:extLst>
+          </p:cNvPr>
+          <p:cNvSpPr/>
+          <p:nvPr/>
+        </p:nvSpPr>
+        <p:spPr>
+          <a:xfrm>
+            <a:off x="4431328" y="1794773"/>
+            <a:ext cx="224176" cy="224175"/>
+          </a:xfrm>
+          <a:prstGeom prst="ellipse">
+            <a:avLst/>
+          </a:prstGeom>
+          <a:noFill/>
+          <a:effectLst>
+            <a:outerShdw blurRad="50800" dist="38100" dir="2700000" algn="tl" rotWithShape="0">
+              <a:prstClr val="black">
+                <a:alpha val="40000"/>
+              </a:prstClr>
+            </a:outerShdw>
+          </a:effectLst>
+        </p:spPr>
+        <p:style>
+          <a:lnRef idx="2">
+            <a:schemeClr val="accent1">
+              <a:shade val="50000"/>
+            </a:schemeClr>
+          </a:lnRef>
+          <a:fillRef idx="1">
+            <a:schemeClr val="accent1"/>
+          </a:fillRef>
+          <a:effectRef idx="0">
+            <a:schemeClr val="accent1"/>
+          </a:effectRef>
+          <a:fontRef idx="minor">
+            <a:schemeClr val="lt1"/>
+          </a:fontRef>
+        </p:style>
+        <p:txBody>
+          <a:bodyPr rtlCol="0" anchor="ctr"/>
+          <a:lstStyle/>
+          <a:p>
+            <a:pPr algn="ctr"/>
+            <a:endParaRPr kumimoji="1" lang="ja-JP" altLang="en-US" dirty="0"/>
+          </a:p>
+        </p:txBody>
+      </p:sp>
+      <p:sp>
+        <p:nvSpPr>
+          <p:cNvPr id="7" name="楕円 6">
+            <a:extLst>
+              <a:ext uri="{FF2B5EF4-FFF2-40B4-BE49-F238E27FC236}">
+                <a16:creationId xmlns:a16="http://schemas.microsoft.com/office/drawing/2014/main" id="{BE9CE535-1542-54A5-31E4-D07E5B2C557F}"/>
+              </a:ext>
+            </a:extLst>
+          </p:cNvPr>
+          <p:cNvSpPr/>
+          <p:nvPr/>
+        </p:nvSpPr>
+        <p:spPr>
+          <a:xfrm>
+            <a:off x="1246414" y="3509273"/>
+            <a:ext cx="1583871" cy="458570"/>
+          </a:xfrm>
+          <a:prstGeom prst="ellipse">
+            <a:avLst/>
+          </a:prstGeom>
+          <a:noFill/>
+          <a:effectLst>
+            <a:outerShdw blurRad="50800" dist="38100" dir="2700000" algn="tl" rotWithShape="0">
+              <a:prstClr val="black">
+                <a:alpha val="40000"/>
+              </a:prstClr>
+            </a:outerShdw>
+          </a:effectLst>
+        </p:spPr>
+        <p:style>
+          <a:lnRef idx="2">
+            <a:schemeClr val="accent1">
+              <a:shade val="50000"/>
+            </a:schemeClr>
+          </a:lnRef>
+          <a:fillRef idx="1">
+            <a:schemeClr val="accent1"/>
+          </a:fillRef>
+          <a:effectRef idx="0">
+            <a:schemeClr val="accent1"/>
+          </a:effectRef>
+          <a:fontRef idx="minor">
+            <a:schemeClr val="lt1"/>
+          </a:fontRef>
+        </p:style>
+        <p:txBody>
+          <a:bodyPr rtlCol="0" anchor="ctr"/>
+          <a:lstStyle/>
+          <a:p>
+            <a:pPr algn="ctr"/>
+            <a:endParaRPr kumimoji="1" lang="ja-JP" altLang="en-US" dirty="0"/>
+          </a:p>
+        </p:txBody>
+      </p:sp>
+      <p:pic>
+        <p:nvPicPr>
+          <p:cNvPr id="11" name="図 10">
+            <a:extLst>
+              <a:ext uri="{FF2B5EF4-FFF2-40B4-BE49-F238E27FC236}">
+                <a16:creationId xmlns:a16="http://schemas.microsoft.com/office/drawing/2014/main" id="{6CCA453D-9E28-82D2-E603-7C92B0F6F956}"/>
+              </a:ext>
+            </a:extLst>
+          </p:cNvPr>
+          <p:cNvPicPr>
+            <a:picLocks noChangeAspect="1"/>
+          </p:cNvPicPr>
+          <p:nvPr/>
+        </p:nvPicPr>
+        <p:blipFill>
+          <a:blip r:embed="rId4"/>
+          <a:stretch>
+            <a:fillRect/>
+          </a:stretch>
+        </p:blipFill>
+        <p:spPr>
+          <a:xfrm>
+            <a:off x="5440708" y="363133"/>
+            <a:ext cx="3648863" cy="2561003"/>
+          </a:xfrm>
+          <a:prstGeom prst="rect">
+            <a:avLst/>
+          </a:prstGeom>
+        </p:spPr>
+      </p:pic>
+      <p:sp>
+        <p:nvSpPr>
+          <p:cNvPr id="12" name="楕円 11">
+            <a:extLst>
+              <a:ext uri="{FF2B5EF4-FFF2-40B4-BE49-F238E27FC236}">
+                <a16:creationId xmlns:a16="http://schemas.microsoft.com/office/drawing/2014/main" id="{FBFB953E-938D-EA4E-182A-9F05F61F9F66}"/>
+              </a:ext>
+            </a:extLst>
+          </p:cNvPr>
+          <p:cNvSpPr/>
+          <p:nvPr/>
+        </p:nvSpPr>
+        <p:spPr>
+          <a:xfrm>
+            <a:off x="5440708" y="1179380"/>
+            <a:ext cx="845792" cy="513350"/>
+          </a:xfrm>
+          <a:prstGeom prst="ellipse">
+            <a:avLst/>
+          </a:prstGeom>
+          <a:noFill/>
+          <a:effectLst>
+            <a:outerShdw blurRad="50800" dist="38100" dir="2700000" algn="tl" rotWithShape="0">
+              <a:prstClr val="black">
+                <a:alpha val="40000"/>
+              </a:prstClr>
+            </a:outerShdw>
+          </a:effectLst>
+        </p:spPr>
+        <p:style>
+          <a:lnRef idx="2">
+            <a:schemeClr val="accent1">
+              <a:shade val="50000"/>
+            </a:schemeClr>
+          </a:lnRef>
+          <a:fillRef idx="1">
+            <a:schemeClr val="accent1"/>
+          </a:fillRef>
+          <a:effectRef idx="0">
+            <a:schemeClr val="accent1"/>
+          </a:effectRef>
+          <a:fontRef idx="minor">
+            <a:schemeClr val="lt1"/>
+          </a:fontRef>
+        </p:style>
+        <p:txBody>
+          <a:bodyPr rtlCol="0" anchor="ctr"/>
+          <a:lstStyle/>
+          <a:p>
+            <a:pPr algn="ctr"/>
+            <a:endParaRPr kumimoji="1" lang="ja-JP" altLang="en-US" dirty="0"/>
+          </a:p>
+        </p:txBody>
+      </p:sp>
+      <p:sp>
+        <p:nvSpPr>
+          <p:cNvPr id="13" name="楕円 12">
+            <a:extLst>
+              <a:ext uri="{FF2B5EF4-FFF2-40B4-BE49-F238E27FC236}">
+                <a16:creationId xmlns:a16="http://schemas.microsoft.com/office/drawing/2014/main" id="{4092C93F-AF4D-83D8-D25E-CB534AA11A9D}"/>
+              </a:ext>
+            </a:extLst>
+          </p:cNvPr>
+          <p:cNvSpPr/>
+          <p:nvPr/>
+        </p:nvSpPr>
+        <p:spPr>
+          <a:xfrm>
+            <a:off x="8755408" y="1566429"/>
+            <a:ext cx="334163" cy="252602"/>
+          </a:xfrm>
+          <a:prstGeom prst="ellipse">
+            <a:avLst/>
+          </a:prstGeom>
+          <a:noFill/>
+          <a:effectLst>
+            <a:outerShdw blurRad="50800" dist="38100" dir="2700000" algn="tl" rotWithShape="0">
+              <a:prstClr val="black">
+                <a:alpha val="40000"/>
+              </a:prstClr>
+            </a:outerShdw>
+          </a:effectLst>
+        </p:spPr>
+        <p:style>
+          <a:lnRef idx="2">
+            <a:schemeClr val="accent1">
+              <a:shade val="50000"/>
+            </a:schemeClr>
+          </a:lnRef>
+          <a:fillRef idx="1">
+            <a:schemeClr val="accent1"/>
+          </a:fillRef>
+          <a:effectRef idx="0">
+            <a:schemeClr val="accent1"/>
+          </a:effectRef>
+          <a:fontRef idx="minor">
+            <a:schemeClr val="lt1"/>
+          </a:fontRef>
+        </p:style>
+        <p:txBody>
+          <a:bodyPr rtlCol="0" anchor="ctr"/>
+          <a:lstStyle/>
+          <a:p>
+            <a:pPr algn="ctr"/>
+            <a:endParaRPr kumimoji="1" lang="ja-JP" altLang="en-US" dirty="0"/>
+          </a:p>
+        </p:txBody>
+      </p:sp>
+      <p:sp>
+        <p:nvSpPr>
+          <p:cNvPr id="15" name="吹き出し: 四角形 14">
+            <a:extLst>
+              <a:ext uri="{FF2B5EF4-FFF2-40B4-BE49-F238E27FC236}">
+                <a16:creationId xmlns:a16="http://schemas.microsoft.com/office/drawing/2014/main" id="{B3B3C540-D999-BA26-52BF-378455A0ABE9}"/>
+              </a:ext>
+            </a:extLst>
+          </p:cNvPr>
+          <p:cNvSpPr/>
+          <p:nvPr/>
+        </p:nvSpPr>
+        <p:spPr>
+          <a:xfrm>
+            <a:off x="9023354" y="1906860"/>
+            <a:ext cx="1040490" cy="240726"/>
+          </a:xfrm>
+          <a:prstGeom prst="wedgeRectCallout">
+            <a:avLst>
+              <a:gd name="adj1" fmla="val -52518"/>
+              <a:gd name="adj2" fmla="val -95710"/>
+            </a:avLst>
+          </a:prstGeom>
+          <a:effectLst>
+            <a:outerShdw blurRad="50800" dist="38100" dir="2700000" algn="tl" rotWithShape="0">
+              <a:prstClr val="black">
+                <a:alpha val="40000"/>
+              </a:prstClr>
+            </a:outerShdw>
+          </a:effectLst>
+        </p:spPr>
+        <p:style>
+          <a:lnRef idx="2">
+            <a:schemeClr val="dk1"/>
+          </a:lnRef>
+          <a:fillRef idx="1">
+            <a:schemeClr val="lt1"/>
+          </a:fillRef>
+          <a:effectRef idx="0">
+            <a:schemeClr val="dk1"/>
+          </a:effectRef>
+          <a:fontRef idx="minor">
+            <a:schemeClr val="dk1"/>
+          </a:fontRef>
+        </p:style>
+        <p:txBody>
+          <a:bodyPr rtlCol="0" anchor="ctr"/>
+          <a:lstStyle/>
+          <a:p>
+            <a:pPr algn="ctr"/>
+            <a:r>
+              <a:rPr lang="en-US" altLang="ja-JP" sz="1050" dirty="0"/>
+              <a:t>Add Image</a:t>
+            </a:r>
+            <a:endParaRPr kumimoji="1" lang="ja-JP" altLang="en-US" sz="1050" dirty="0"/>
+          </a:p>
+        </p:txBody>
+      </p:sp>
+      <p:sp>
+        <p:nvSpPr>
+          <p:cNvPr id="16" name="楕円 15">
+            <a:extLst>
+              <a:ext uri="{FF2B5EF4-FFF2-40B4-BE49-F238E27FC236}">
+                <a16:creationId xmlns:a16="http://schemas.microsoft.com/office/drawing/2014/main" id="{CBC0D50F-00E5-6014-7A22-561449848D8D}"/>
+              </a:ext>
+            </a:extLst>
+          </p:cNvPr>
+          <p:cNvSpPr/>
+          <p:nvPr/>
+        </p:nvSpPr>
+        <p:spPr>
+          <a:xfrm>
+            <a:off x="8646550" y="2671534"/>
+            <a:ext cx="334163" cy="252602"/>
+          </a:xfrm>
+          <a:prstGeom prst="ellipse">
+            <a:avLst/>
+          </a:prstGeom>
+          <a:noFill/>
+          <a:effectLst>
+            <a:outerShdw blurRad="50800" dist="38100" dir="2700000" algn="tl" rotWithShape="0">
+              <a:prstClr val="black">
+                <a:alpha val="40000"/>
+              </a:prstClr>
+            </a:outerShdw>
+          </a:effectLst>
+        </p:spPr>
+        <p:style>
+          <a:lnRef idx="2">
+            <a:schemeClr val="accent1">
+              <a:shade val="50000"/>
+            </a:schemeClr>
+          </a:lnRef>
+          <a:fillRef idx="1">
+            <a:schemeClr val="accent1"/>
+          </a:fillRef>
+          <a:effectRef idx="0">
+            <a:schemeClr val="accent1"/>
+          </a:effectRef>
+          <a:fontRef idx="minor">
+            <a:schemeClr val="lt1"/>
+          </a:fontRef>
+        </p:style>
+        <p:txBody>
+          <a:bodyPr rtlCol="0" anchor="ctr"/>
+          <a:lstStyle/>
+          <a:p>
+            <a:pPr algn="ctr"/>
+            <a:endParaRPr kumimoji="1" lang="ja-JP" altLang="en-US" dirty="0"/>
+          </a:p>
+        </p:txBody>
+      </p:sp>
+      <p:pic>
+        <p:nvPicPr>
+          <p:cNvPr id="18" name="図 17">
+            <a:extLst>
+              <a:ext uri="{FF2B5EF4-FFF2-40B4-BE49-F238E27FC236}">
+                <a16:creationId xmlns:a16="http://schemas.microsoft.com/office/drawing/2014/main" id="{D8584B8B-611A-C7BD-6508-F55CD397F6B4}"/>
+              </a:ext>
+            </a:extLst>
+          </p:cNvPr>
+          <p:cNvPicPr>
+            <a:picLocks noChangeAspect="1"/>
+          </p:cNvPicPr>
+          <p:nvPr/>
+        </p:nvPicPr>
+        <p:blipFill>
+          <a:blip r:embed="rId5"/>
+          <a:stretch>
+            <a:fillRect/>
+          </a:stretch>
+        </p:blipFill>
+        <p:spPr>
+          <a:xfrm>
+            <a:off x="5440708" y="3330244"/>
+            <a:ext cx="3973182" cy="2867650"/>
+          </a:xfrm>
+          <a:prstGeom prst="rect">
+            <a:avLst/>
+          </a:prstGeom>
+        </p:spPr>
+      </p:pic>
+      <p:sp>
+        <p:nvSpPr>
+          <p:cNvPr id="19" name="楕円 18">
+            <a:extLst>
+              <a:ext uri="{FF2B5EF4-FFF2-40B4-BE49-F238E27FC236}">
+                <a16:creationId xmlns:a16="http://schemas.microsoft.com/office/drawing/2014/main" id="{0477A189-6BB5-4B27-17D6-DB9995470FC2}"/>
+              </a:ext>
+            </a:extLst>
+          </p:cNvPr>
+          <p:cNvSpPr/>
+          <p:nvPr/>
+        </p:nvSpPr>
+        <p:spPr>
+          <a:xfrm>
+            <a:off x="9023354" y="5291571"/>
+            <a:ext cx="334163" cy="252602"/>
+          </a:xfrm>
+          <a:prstGeom prst="ellipse">
+            <a:avLst/>
+          </a:prstGeom>
+          <a:noFill/>
+          <a:effectLst>
+            <a:outerShdw blurRad="50800" dist="38100" dir="2700000" algn="tl" rotWithShape="0">
+              <a:prstClr val="black">
+                <a:alpha val="40000"/>
+              </a:prstClr>
+            </a:outerShdw>
+          </a:effectLst>
+        </p:spPr>
+        <p:style>
+          <a:lnRef idx="2">
+            <a:schemeClr val="accent1">
+              <a:shade val="50000"/>
+            </a:schemeClr>
+          </a:lnRef>
+          <a:fillRef idx="1">
+            <a:schemeClr val="accent1"/>
+          </a:fillRef>
+          <a:effectRef idx="0">
+            <a:schemeClr val="accent1"/>
+          </a:effectRef>
+          <a:fontRef idx="minor">
+            <a:schemeClr val="lt1"/>
+          </a:fontRef>
+        </p:style>
+        <p:txBody>
+          <a:bodyPr rtlCol="0" anchor="ctr"/>
+          <a:lstStyle/>
+          <a:p>
+            <a:pPr algn="ctr"/>
+            <a:endParaRPr kumimoji="1" lang="ja-JP" altLang="en-US" dirty="0"/>
+          </a:p>
+        </p:txBody>
+      </p:sp>
+      <p:sp>
+        <p:nvSpPr>
+          <p:cNvPr id="20" name="楕円 19">
+            <a:extLst>
+              <a:ext uri="{FF2B5EF4-FFF2-40B4-BE49-F238E27FC236}">
+                <a16:creationId xmlns:a16="http://schemas.microsoft.com/office/drawing/2014/main" id="{528BDC93-49C7-E8C8-64BD-D72F4CC75E96}"/>
+              </a:ext>
+            </a:extLst>
+          </p:cNvPr>
+          <p:cNvSpPr/>
+          <p:nvPr/>
+        </p:nvSpPr>
+        <p:spPr>
+          <a:xfrm>
+            <a:off x="5519801" y="5291571"/>
+            <a:ext cx="766699" cy="252602"/>
+          </a:xfrm>
+          <a:prstGeom prst="ellipse">
+            <a:avLst/>
+          </a:prstGeom>
+          <a:noFill/>
+          <a:effectLst>
+            <a:outerShdw blurRad="50800" dist="38100" dir="2700000" algn="tl" rotWithShape="0">
+              <a:prstClr val="black">
+                <a:alpha val="40000"/>
+              </a:prstClr>
+            </a:outerShdw>
+          </a:effectLst>
+        </p:spPr>
+        <p:style>
+          <a:lnRef idx="2">
+            <a:schemeClr val="accent1">
+              <a:shade val="50000"/>
+            </a:schemeClr>
+          </a:lnRef>
+          <a:fillRef idx="1">
+            <a:schemeClr val="accent1"/>
+          </a:fillRef>
+          <a:effectRef idx="0">
+            <a:schemeClr val="accent1"/>
+          </a:effectRef>
+          <a:fontRef idx="minor">
+            <a:schemeClr val="lt1"/>
+          </a:fontRef>
+        </p:style>
+        <p:txBody>
+          <a:bodyPr rtlCol="0" anchor="ctr"/>
+          <a:lstStyle/>
+          <a:p>
+            <a:pPr algn="ctr"/>
+            <a:endParaRPr kumimoji="1" lang="ja-JP" altLang="en-US" dirty="0"/>
+          </a:p>
+        </p:txBody>
+      </p:sp>
+    </p:spTree>
+    <p:extLst>
+      <p:ext uri="{BB962C8B-B14F-4D97-AF65-F5344CB8AC3E}">
+        <p14:creationId xmlns:p14="http://schemas.microsoft.com/office/powerpoint/2010/main" val="2738632757"/>
+      </p:ext>
+    </p:extLst>
+  </p:cSld>
+  <p:clrMapOvr>
+    <a:masterClrMapping/>
+  </p:clrMapOvr>
+</p:sld>
+</file>
+
+<file path=ppt/slides/slide5.xml><?xml version="1.0" encoding="utf-8"?>
+<p:sld xmlns:a="http://schemas.openxmlformats.org/drawingml/2006/main" xmlns:r="http://schemas.openxmlformats.org/officeDocument/2006/relationships" xmlns:p="http://schemas.openxmlformats.org/presentationml/2006/main">
+  <p:cSld>
+    <p:spTree>
+      <p:nvGrpSpPr>
+        <p:cNvPr id="1" name=""/>
+        <p:cNvGrpSpPr/>
+        <p:nvPr/>
+      </p:nvGrpSpPr>
+      <p:grpSpPr>
+        <a:xfrm>
+          <a:off x="0" y="0"/>
+          <a:ext cx="0" cy="0"/>
+          <a:chOff x="0" y="0"/>
+          <a:chExt cx="0" cy="0"/>
+        </a:xfrm>
+      </p:grpSpPr>
+      <p:pic>
+        <p:nvPicPr>
+          <p:cNvPr id="3" name="図 2">
+            <a:extLst>
+              <a:ext uri="{FF2B5EF4-FFF2-40B4-BE49-F238E27FC236}">
+                <a16:creationId xmlns:a16="http://schemas.microsoft.com/office/drawing/2014/main" id="{C47B06C0-4721-650C-7E34-6A2DBC221BAA}"/>
+              </a:ext>
+            </a:extLst>
+          </p:cNvPr>
+          <p:cNvPicPr>
+            <a:picLocks noChangeAspect="1"/>
+          </p:cNvPicPr>
+          <p:nvPr/>
+        </p:nvPicPr>
+        <p:blipFill>
+          <a:blip r:embed="rId2"/>
+          <a:stretch>
+            <a:fillRect/>
+          </a:stretch>
+        </p:blipFill>
+        <p:spPr>
+          <a:xfrm>
+            <a:off x="722826" y="622612"/>
+            <a:ext cx="4934639" cy="1486107"/>
+          </a:xfrm>
+          <a:prstGeom prst="rect">
+            <a:avLst/>
+          </a:prstGeom>
+        </p:spPr>
+      </p:pic>
+      <p:pic>
+        <p:nvPicPr>
+          <p:cNvPr id="4" name="図 3">
+            <a:extLst>
+              <a:ext uri="{FF2B5EF4-FFF2-40B4-BE49-F238E27FC236}">
+                <a16:creationId xmlns:a16="http://schemas.microsoft.com/office/drawing/2014/main" id="{C0C317DA-32C8-7C7D-4A22-ABA2910E32D1}"/>
+              </a:ext>
+            </a:extLst>
+          </p:cNvPr>
+          <p:cNvPicPr>
+            <a:picLocks noChangeAspect="1"/>
+          </p:cNvPicPr>
+          <p:nvPr/>
+        </p:nvPicPr>
+        <p:blipFill>
+          <a:blip r:embed="rId3"/>
+          <a:stretch>
+            <a:fillRect/>
+          </a:stretch>
+        </p:blipFill>
+        <p:spPr>
+          <a:xfrm>
+            <a:off x="679068" y="2759275"/>
+            <a:ext cx="6163535" cy="1486107"/>
+          </a:xfrm>
+          <a:prstGeom prst="rect">
+            <a:avLst/>
+          </a:prstGeom>
+        </p:spPr>
+      </p:pic>
+      <p:sp>
+        <p:nvSpPr>
+          <p:cNvPr id="6" name="テキスト ボックス 5">
+            <a:extLst>
+              <a:ext uri="{FF2B5EF4-FFF2-40B4-BE49-F238E27FC236}">
+                <a16:creationId xmlns:a16="http://schemas.microsoft.com/office/drawing/2014/main" id="{572A1BEF-BC11-04D6-FAEF-AEFED036C64F}"/>
+              </a:ext>
+            </a:extLst>
+          </p:cNvPr>
+          <p:cNvSpPr txBox="1"/>
+          <p:nvPr/>
+        </p:nvSpPr>
+        <p:spPr>
+          <a:xfrm>
+            <a:off x="1692815" y="3040380"/>
+            <a:ext cx="1497330" cy="307777"/>
+          </a:xfrm>
+          <a:prstGeom prst="rect">
+            <a:avLst/>
+          </a:prstGeom>
+          <a:noFill/>
+        </p:spPr>
+        <p:txBody>
+          <a:bodyPr wrap="square" rtlCol="0">
+            <a:spAutoFit/>
+          </a:bodyPr>
+          <a:lstStyle/>
+          <a:p>
+            <a:r>
+              <a:rPr kumimoji="1" lang="en-US" altLang="ja-JP" sz="1400" b="1" dirty="0">
+                <a:solidFill>
+                  <a:srgbClr val="00B0F0"/>
+                </a:solidFill>
+              </a:rPr>
+              <a:t>Double click</a:t>
+            </a:r>
+            <a:endParaRPr kumimoji="1" lang="ja-JP" altLang="en-US" sz="1400" b="1" dirty="0">
+              <a:solidFill>
+                <a:srgbClr val="00B0F0"/>
+              </a:solidFill>
+            </a:endParaRPr>
+          </a:p>
+        </p:txBody>
+      </p:sp>
+      <p:pic>
+        <p:nvPicPr>
+          <p:cNvPr id="8" name="図 7">
+            <a:extLst>
+              <a:ext uri="{FF2B5EF4-FFF2-40B4-BE49-F238E27FC236}">
+                <a16:creationId xmlns:a16="http://schemas.microsoft.com/office/drawing/2014/main" id="{1DB13F73-30E6-866B-74EB-D75126E3A650}"/>
+              </a:ext>
+            </a:extLst>
+          </p:cNvPr>
+          <p:cNvPicPr>
+            <a:picLocks noChangeAspect="1"/>
+          </p:cNvPicPr>
+          <p:nvPr/>
+        </p:nvPicPr>
+        <p:blipFill>
+          <a:blip r:embed="rId4"/>
+          <a:stretch>
+            <a:fillRect/>
+          </a:stretch>
+        </p:blipFill>
+        <p:spPr>
+          <a:xfrm>
+            <a:off x="777780" y="4895938"/>
+            <a:ext cx="2412365" cy="1595273"/>
+          </a:xfrm>
+          <a:prstGeom prst="rect">
+            <a:avLst/>
+          </a:prstGeom>
+        </p:spPr>
+      </p:pic>
+      <p:sp>
+        <p:nvSpPr>
+          <p:cNvPr id="9" name="楕円 8">
+            <a:extLst>
+              <a:ext uri="{FF2B5EF4-FFF2-40B4-BE49-F238E27FC236}">
+                <a16:creationId xmlns:a16="http://schemas.microsoft.com/office/drawing/2014/main" id="{B5C0D5BA-63DB-0FE0-EE27-2261E39E7641}"/>
+              </a:ext>
+            </a:extLst>
+          </p:cNvPr>
+          <p:cNvSpPr/>
+          <p:nvPr/>
+        </p:nvSpPr>
+        <p:spPr>
+          <a:xfrm>
+            <a:off x="900879" y="5428526"/>
+            <a:ext cx="1645551" cy="379691"/>
+          </a:xfrm>
+          <a:prstGeom prst="ellipse">
+            <a:avLst/>
+          </a:prstGeom>
+          <a:noFill/>
+          <a:ln>
+            <a:solidFill>
+              <a:srgbClr val="FFC000"/>
+            </a:solidFill>
+          </a:ln>
+          <a:effectLst>
+            <a:outerShdw blurRad="50800" dist="38100" dir="2700000" algn="tl" rotWithShape="0">
+              <a:prstClr val="black">
+                <a:alpha val="40000"/>
+              </a:prstClr>
+            </a:outerShdw>
+          </a:effectLst>
+        </p:spPr>
+        <p:style>
+          <a:lnRef idx="2">
+            <a:schemeClr val="accent1">
+              <a:shade val="50000"/>
+            </a:schemeClr>
+          </a:lnRef>
+          <a:fillRef idx="1">
+            <a:schemeClr val="accent1"/>
+          </a:fillRef>
+          <a:effectRef idx="0">
+            <a:schemeClr val="accent1"/>
+          </a:effectRef>
+          <a:fontRef idx="minor">
+            <a:schemeClr val="lt1"/>
+          </a:fontRef>
+        </p:style>
+        <p:txBody>
+          <a:bodyPr rtlCol="0" anchor="ctr"/>
+          <a:lstStyle/>
+          <a:p>
+            <a:pPr algn="ctr"/>
+            <a:endParaRPr kumimoji="1" lang="ja-JP" altLang="en-US" dirty="0"/>
+          </a:p>
+        </p:txBody>
+      </p:sp>
     </p:spTree>
     <p:extLst>
       <p:ext uri="{BB962C8B-B14F-4D97-AF65-F5344CB8AC3E}">

</xml_diff>